<commit_message>
relecture semaines 1 et 2
</commit_message>
<xml_diff>
--- a/w1/w1-s6-av-slide1.pptx
+++ b/w1/w1-s6-av-slide1.pptx
@@ -167,7 +167,7 @@
       </p14:sectionLst>
     </p:ext>
     <p:ext uri="{EFAFB233-063F-42B5-8137-9DF3F51BA10A}">
-      <p15:sldGuideLst xmlns:p15="http://schemas.microsoft.com/office/powerpoint/2012/main">
+      <p15:sldGuideLst xmlns:p15="http://schemas.microsoft.com/office/powerpoint/2012/main" xmlns="">
         <p15:guide id="1" orient="horz" pos="2160" userDrawn="1">
           <p15:clr>
             <a:srgbClr val="A4A3A4"/>
@@ -418,7 +418,7 @@
               <a:pPr>
                 <a:defRPr/>
               </a:pPr>
-              <a:t>‹N°›</a:t>
+              <a:t>‹#›</a:t>
             </a:fld>
             <a:endParaRPr lang="en-US"/>
           </a:p>
@@ -592,7 +592,7 @@
             <a:tailEnd/>
           </a:ln>
           <a:extLst>
-            <a:ext uri="{909E8E84-426E-40DD-AFC4-6F175D3DCCD1}">
+            <a:ext uri="{909E8E84-426E-40dd-AFC4-6F175D3DCCD1}">
               <a14:hiddenFill xmlns:a14="http://schemas.microsoft.com/office/drawing/2010/main">
                 <a:solidFill>
                   <a:srgbClr val="FFFFFF"/>
@@ -778,7 +778,7 @@
               <a:pPr>
                 <a:defRPr/>
               </a:pPr>
-              <a:t>‹N°›</a:t>
+              <a:t>‹#›</a:t>
             </a:fld>
             <a:endParaRPr lang="en-US"/>
           </a:p>
@@ -1287,7 +1287,7 @@
   <p:timing>
     <p:tnLst>
       <p:par>
-        <p:cTn id="1" dur="indefinite" restart="never" nodeType="tmRoot"/>
+        <p:cTn xmlns:p14="http://schemas.microsoft.com/office/powerpoint/2010/main" id="1" dur="indefinite" restart="never" nodeType="tmRoot"/>
       </p:par>
     </p:tnLst>
   </p:timing>
@@ -1443,7 +1443,7 @@
               <a:pPr>
                 <a:defRPr/>
               </a:pPr>
-              <a:t>‹N°›</a:t>
+              <a:t>‹#›</a:t>
             </a:fld>
             <a:endParaRPr lang="fr-FR"/>
           </a:p>
@@ -1621,7 +1621,7 @@
               <a:pPr>
                 <a:defRPr/>
               </a:pPr>
-              <a:t>‹N°›</a:t>
+              <a:t>‹#›</a:t>
             </a:fld>
             <a:endParaRPr lang="fr-FR"/>
           </a:p>
@@ -1856,7 +1856,7 @@
               <a:pPr>
                 <a:defRPr/>
               </a:pPr>
-              <a:t>‹N°›</a:t>
+              <a:t>‹#›</a:t>
             </a:fld>
             <a:endParaRPr lang="fr-FR"/>
           </a:p>
@@ -2024,7 +2024,7 @@
               <a:pPr>
                 <a:defRPr/>
               </a:pPr>
-              <a:t>‹N°›</a:t>
+              <a:t>‹#›</a:t>
             </a:fld>
             <a:endParaRPr lang="fr-FR"/>
           </a:p>
@@ -2043,7 +2043,7 @@
   <p:timing>
     <p:tnLst>
       <p:par>
-        <p:cTn id="1" dur="indefinite" restart="never" nodeType="tmRoot"/>
+        <p:cTn xmlns:p14="http://schemas.microsoft.com/office/powerpoint/2010/main" id="1" dur="indefinite" restart="never" nodeType="tmRoot"/>
       </p:par>
     </p:tnLst>
   </p:timing>
@@ -2221,7 +2221,7 @@
               <a:pPr>
                 <a:defRPr/>
               </a:pPr>
-              <a:t>‹N°›</a:t>
+              <a:t>‹#›</a:t>
             </a:fld>
             <a:endParaRPr lang="fr-FR"/>
           </a:p>
@@ -2240,7 +2240,7 @@
   <p:timing>
     <p:tnLst>
       <p:par>
-        <p:cTn id="1" dur="indefinite" restart="never" nodeType="tmRoot"/>
+        <p:cTn xmlns:p14="http://schemas.microsoft.com/office/powerpoint/2010/main" id="1" dur="indefinite" restart="never" nodeType="tmRoot"/>
       </p:par>
     </p:tnLst>
   </p:timing>
@@ -2514,7 +2514,7 @@
               <a:pPr>
                 <a:defRPr/>
               </a:pPr>
-              <a:t>‹N°›</a:t>
+              <a:t>‹#›</a:t>
             </a:fld>
             <a:endParaRPr lang="fr-FR"/>
           </a:p>
@@ -2533,7 +2533,7 @@
   <p:timing>
     <p:tnLst>
       <p:par>
-        <p:cTn id="1" dur="indefinite" restart="never" nodeType="tmRoot"/>
+        <p:cTn xmlns:p14="http://schemas.microsoft.com/office/powerpoint/2010/main" id="1" dur="indefinite" restart="never" nodeType="tmRoot"/>
       </p:par>
     </p:tnLst>
   </p:timing>
@@ -2941,7 +2941,7 @@
               <a:pPr>
                 <a:defRPr/>
               </a:pPr>
-              <a:t>‹N°›</a:t>
+              <a:t>‹#›</a:t>
             </a:fld>
             <a:endParaRPr lang="fr-FR"/>
           </a:p>
@@ -2960,7 +2960,7 @@
   <p:timing>
     <p:tnLst>
       <p:par>
-        <p:cTn id="1" dur="indefinite" restart="never" nodeType="tmRoot"/>
+        <p:cTn xmlns:p14="http://schemas.microsoft.com/office/powerpoint/2010/main" id="1" dur="indefinite" restart="never" nodeType="tmRoot"/>
       </p:par>
     </p:tnLst>
   </p:timing>
@@ -3064,7 +3064,7 @@
               <a:pPr>
                 <a:defRPr/>
               </a:pPr>
-              <a:t>‹N°›</a:t>
+              <a:t>‹#›</a:t>
             </a:fld>
             <a:endParaRPr lang="fr-FR"/>
           </a:p>
@@ -3083,7 +3083,7 @@
   <p:timing>
     <p:tnLst>
       <p:par>
-        <p:cTn id="1" dur="indefinite" restart="never" nodeType="tmRoot"/>
+        <p:cTn xmlns:p14="http://schemas.microsoft.com/office/powerpoint/2010/main" id="1" dur="indefinite" restart="never" nodeType="tmRoot"/>
       </p:par>
     </p:tnLst>
   </p:timing>
@@ -3164,7 +3164,7 @@
               <a:pPr>
                 <a:defRPr/>
               </a:pPr>
-              <a:t>‹N°›</a:t>
+              <a:t>‹#›</a:t>
             </a:fld>
             <a:endParaRPr lang="fr-FR"/>
           </a:p>
@@ -3183,7 +3183,7 @@
   <p:timing>
     <p:tnLst>
       <p:par>
-        <p:cTn id="1" dur="indefinite" restart="never" nodeType="tmRoot"/>
+        <p:cTn xmlns:p14="http://schemas.microsoft.com/office/powerpoint/2010/main" id="1" dur="indefinite" restart="never" nodeType="tmRoot"/>
       </p:par>
     </p:tnLst>
   </p:timing>
@@ -3446,7 +3446,7 @@
               <a:pPr>
                 <a:defRPr/>
               </a:pPr>
-              <a:t>‹N°›</a:t>
+              <a:t>‹#›</a:t>
             </a:fld>
             <a:endParaRPr lang="fr-FR"/>
           </a:p>
@@ -3698,7 +3698,7 @@
               <a:pPr>
                 <a:defRPr/>
               </a:pPr>
-              <a:t>‹N°›</a:t>
+              <a:t>‹#›</a:t>
             </a:fld>
             <a:endParaRPr lang="fr-FR"/>
           </a:p>
@@ -3765,14 +3765,14 @@
             <a:noFill/>
           </a:ln>
           <a:extLst>
-            <a:ext uri="{909E8E84-426E-40DD-AFC4-6F175D3DCCD1}">
+            <a:ext uri="{909E8E84-426E-40dd-AFC4-6F175D3DCCD1}">
               <a14:hiddenFill xmlns:a14="http://schemas.microsoft.com/office/drawing/2010/main">
                 <a:solidFill>
                   <a:srgbClr val="FFFFFF"/>
                 </a:solidFill>
               </a14:hiddenFill>
             </a:ext>
-            <a:ext uri="{91240B29-F687-4F45-9708-019B960494DF}">
+            <a:ext uri="{91240B29-F687-4f45-9708-019B960494DF}">
               <a14:hiddenLine xmlns:a14="http://schemas.microsoft.com/office/drawing/2010/main" w="9525">
                 <a:solidFill>
                   <a:srgbClr val="000000"/>
@@ -3823,14 +3823,14 @@
             <a:noFill/>
           </a:ln>
           <a:extLst>
-            <a:ext uri="{909E8E84-426E-40DD-AFC4-6F175D3DCCD1}">
+            <a:ext uri="{909E8E84-426E-40dd-AFC4-6F175D3DCCD1}">
               <a14:hiddenFill xmlns:a14="http://schemas.microsoft.com/office/drawing/2010/main">
                 <a:solidFill>
                   <a:srgbClr val="FFFFFF"/>
                 </a:solidFill>
               </a14:hiddenFill>
             </a:ext>
-            <a:ext uri="{91240B29-F687-4F45-9708-019B960494DF}">
+            <a:ext uri="{91240B29-F687-4f45-9708-019B960494DF}">
               <a14:hiddenLine xmlns:a14="http://schemas.microsoft.com/office/drawing/2010/main" w="9525">
                 <a:solidFill>
                   <a:srgbClr val="000000"/>
@@ -3997,7 +3997,7 @@
               <a:pPr>
                 <a:defRPr/>
               </a:pPr>
-              <a:t>‹N°›</a:t>
+              <a:t>‹#›</a:t>
             </a:fld>
             <a:endParaRPr lang="fr-FR" dirty="0"/>
           </a:p>
@@ -4023,7 +4023,7 @@
   <p:timing>
     <p:tnLst>
       <p:par>
-        <p:cTn id="1" dur="indefinite" restart="never" nodeType="tmRoot"/>
+        <p:cTn xmlns:p14="http://schemas.microsoft.com/office/powerpoint/2010/main" id="1" dur="indefinite" restart="never" nodeType="tmRoot"/>
       </p:par>
     </p:tnLst>
   </p:timing>
@@ -4487,7 +4487,7 @@
   <p:timing>
     <p:tnLst>
       <p:par>
-        <p:cTn id="1" dur="indefinite" restart="never" nodeType="tmRoot">
+        <p:cTn xmlns:p14="http://schemas.microsoft.com/office/powerpoint/2010/main" id="1" dur="indefinite" restart="never" nodeType="tmRoot">
           <p:childTnLst>
             <p:seq concurrent="1" nextAc="seek">
               <p:cTn id="2" dur="indefinite" nodeType="mainSeq">
@@ -4800,13 +4800,6 @@
               </a:rPr>
               <a:t>Données et méthodes par </a:t>
             </a:r>
-            <a:r>
-              <a:rPr lang="fr-FR" sz="4400" dirty="0" smtClean="0">
-                <a:latin typeface="Calibri" panose="020F0502020204030204" pitchFamily="34" charset="0"/>
-                <a:cs typeface="Calibri" panose="020F0502020204030204" pitchFamily="34" charset="0"/>
-              </a:rPr>
-              <a:t/>
-            </a:r>
             <a:br>
               <a:rPr lang="fr-FR" sz="4400" dirty="0" smtClean="0">
                 <a:latin typeface="Calibri" panose="020F0502020204030204" pitchFamily="34" charset="0"/>
@@ -4840,7 +4833,7 @@
   <p:timing>
     <p:tnLst>
       <p:par>
-        <p:cTn id="1" dur="indefinite" restart="never" nodeType="tmRoot">
+        <p:cTn xmlns:p14="http://schemas.microsoft.com/office/powerpoint/2010/main" id="1" dur="indefinite" restart="never" nodeType="tmRoot">
           <p:childTnLst>
             <p:seq concurrent="1" nextAc="seek">
               <p:cTn id="2" dur="indefinite" nodeType="mainSeq">
@@ -5794,7 +5787,7 @@
   <p:timing>
     <p:tnLst>
       <p:par>
-        <p:cTn id="1" dur="indefinite" restart="never" nodeType="tmRoot">
+        <p:cTn xmlns:p14="http://schemas.microsoft.com/office/powerpoint/2010/main" id="1" dur="indefinite" restart="never" nodeType="tmRoot">
           <p:childTnLst>
             <p:seq concurrent="1" nextAc="seek">
               <p:cTn id="2" dur="indefinite" nodeType="mainSeq">
@@ -6404,7 +6397,7 @@
   <p:timing>
     <p:tnLst>
       <p:par>
-        <p:cTn id="1" dur="indefinite" restart="never" nodeType="tmRoot">
+        <p:cTn xmlns:p14="http://schemas.microsoft.com/office/powerpoint/2010/main" id="1" dur="indefinite" restart="never" nodeType="tmRoot">
           <p:childTnLst>
             <p:seq concurrent="1" nextAc="seek">
               <p:cTn id="2" dur="indefinite" nodeType="mainSeq">
@@ -6595,7 +6588,7 @@
   <p:timing>
     <p:tnLst>
       <p:par>
-        <p:cTn id="1" dur="indefinite" restart="never" nodeType="tmRoot">
+        <p:cTn xmlns:p14="http://schemas.microsoft.com/office/powerpoint/2010/main" id="1" dur="indefinite" restart="never" nodeType="tmRoot">
           <p:childTnLst>
             <p:seq concurrent="1" nextAc="seek">
               <p:cTn id="2" dur="indefinite" nodeType="mainSeq">
@@ -6895,7 +6888,7 @@
         <p:spPr>
           <a:xfrm>
             <a:off x="713678" y="780585"/>
-            <a:ext cx="9233210" cy="2800767"/>
+            <a:ext cx="9233210" cy="3477875"/>
           </a:xfrm>
           <a:prstGeom prst="rect">
             <a:avLst/>
@@ -6940,6 +6933,35 @@
           </a:p>
           <a:p>
             <a:r>
+              <a:rPr lang="fr-FR" sz="4400" dirty="0">
+                <a:solidFill>
+                  <a:srgbClr val="00B050"/>
+                </a:solidFill>
+                <a:latin typeface="Courier New" panose="02070309020205020404" pitchFamily="49" charset="0"/>
+                <a:cs typeface="Courier New" panose="02070309020205020404" pitchFamily="49" charset="0"/>
+              </a:rPr>
+              <a:t>d</a:t>
+            </a:r>
+            <a:r>
+              <a:rPr lang="fr-FR" sz="4400" dirty="0" smtClean="0">
+                <a:solidFill>
+                  <a:srgbClr val="00B050"/>
+                </a:solidFill>
+                <a:latin typeface="Courier New" panose="02070309020205020404" pitchFamily="49" charset="0"/>
+                <a:cs typeface="Courier New" panose="02070309020205020404" pitchFamily="49" charset="0"/>
+              </a:rPr>
+              <a:t>epartement_06</a:t>
+            </a:r>
+            <a:endParaRPr lang="fr-FR" sz="4400" dirty="0">
+              <a:solidFill>
+                <a:srgbClr val="00B050"/>
+              </a:solidFill>
+              <a:latin typeface="Courier New" panose="02070309020205020404" pitchFamily="49" charset="0"/>
+              <a:cs typeface="Courier New" panose="02070309020205020404" pitchFamily="49" charset="0"/>
+            </a:endParaRPr>
+          </a:p>
+          <a:p>
+            <a:r>
               <a:rPr lang="fr-FR" sz="4400" strike="sngStrike" dirty="0" smtClean="0">
                 <a:solidFill>
                   <a:srgbClr val="FF0000"/>
@@ -6949,6 +6971,13 @@
               </a:rPr>
               <a:t>18_departement</a:t>
             </a:r>
+            <a:endParaRPr lang="fr-FR" sz="4400" strike="sngStrike" dirty="0" smtClean="0">
+              <a:solidFill>
+                <a:srgbClr val="FF0000"/>
+              </a:solidFill>
+              <a:latin typeface="Courier New" panose="02070309020205020404" pitchFamily="49" charset="0"/>
+              <a:cs typeface="Courier New" panose="02070309020205020404" pitchFamily="49" charset="0"/>
+            </a:endParaRPr>
           </a:p>
           <a:p>
             <a:endParaRPr lang="fr-FR" sz="4400" strike="sngStrike" dirty="0">
@@ -6974,7 +7003,7 @@
   <p:timing>
     <p:tnLst>
       <p:par>
-        <p:cTn id="1" dur="indefinite" restart="never" nodeType="tmRoot">
+        <p:cTn xmlns:p14="http://schemas.microsoft.com/office/powerpoint/2010/main" id="1" dur="indefinite" restart="never" nodeType="tmRoot">
           <p:childTnLst>
             <p:seq concurrent="1" nextAc="seek">
               <p:cTn id="2" dur="indefinite" nodeType="mainSeq">
@@ -7132,6 +7161,67 @@
                                         <p:tgtEl>
                                           <p:spTgt spid="4">
                                             <p:txEl>
+                                              <p:pRg st="3" end="3"/>
+                                            </p:txEl>
+                                          </p:spTgt>
+                                        </p:tgtEl>
+                                        <p:attrNameLst>
+                                          <p:attrName>style.visibility</p:attrName>
+                                        </p:attrNameLst>
+                                      </p:cBhvr>
+                                      <p:to>
+                                        <p:strVal val="visible"/>
+                                      </p:to>
+                                    </p:set>
+                                    <p:animEffect transition="in" filter="fade">
+                                      <p:cBhvr>
+                                        <p:cTn id="17" dur="500"/>
+                                        <p:tgtEl>
+                                          <p:spTgt spid="4">
+                                            <p:txEl>
+                                              <p:pRg st="3" end="3"/>
+                                            </p:txEl>
+                                          </p:spTgt>
+                                        </p:tgtEl>
+                                      </p:cBhvr>
+                                    </p:animEffect>
+                                  </p:childTnLst>
+                                </p:cTn>
+                              </p:par>
+                            </p:childTnLst>
+                          </p:cTn>
+                        </p:par>
+                      </p:childTnLst>
+                    </p:cTn>
+                  </p:par>
+                  <p:par>
+                    <p:cTn id="18" fill="hold">
+                      <p:stCondLst>
+                        <p:cond delay="indefinite"/>
+                      </p:stCondLst>
+                      <p:childTnLst>
+                        <p:par>
+                          <p:cTn id="19" fill="hold">
+                            <p:stCondLst>
+                              <p:cond delay="0"/>
+                            </p:stCondLst>
+                            <p:childTnLst>
+                              <p:par>
+                                <p:cTn id="20" presetID="10" presetClass="entr" presetSubtype="0" fill="hold" nodeType="clickEffect">
+                                  <p:stCondLst>
+                                    <p:cond delay="0"/>
+                                  </p:stCondLst>
+                                  <p:childTnLst>
+                                    <p:set>
+                                      <p:cBhvr>
+                                        <p:cTn id="21" dur="1" fill="hold">
+                                          <p:stCondLst>
+                                            <p:cond delay="0"/>
+                                          </p:stCondLst>
+                                        </p:cTn>
+                                        <p:tgtEl>
+                                          <p:spTgt spid="4">
+                                            <p:txEl>
                                               <p:pRg st="2" end="2"/>
                                             </p:txEl>
                                           </p:spTgt>
@@ -7146,7 +7236,7 @@
                                     </p:set>
                                     <p:animEffect transition="in" filter="fade">
                                       <p:cBhvr>
-                                        <p:cTn id="17" dur="500"/>
+                                        <p:cTn id="22" dur="500"/>
                                         <p:tgtEl>
                                           <p:spTgt spid="4">
                                             <p:txEl>
@@ -7270,7 +7360,7 @@
   <p:timing>
     <p:tnLst>
       <p:par>
-        <p:cTn id="1" dur="indefinite" restart="never" nodeType="tmRoot">
+        <p:cTn xmlns:p14="http://schemas.microsoft.com/office/powerpoint/2010/main" id="1" dur="indefinite" restart="never" nodeType="tmRoot">
           <p:childTnLst>
             <p:seq concurrent="1" nextAc="seek">
               <p:cTn id="2" dur="indefinite" nodeType="mainSeq">
@@ -7467,7 +7557,7 @@
   <p:timing>
     <p:tnLst>
       <p:par>
-        <p:cTn id="1" dur="indefinite" restart="never" nodeType="tmRoot">
+        <p:cTn xmlns:p14="http://schemas.microsoft.com/office/powerpoint/2010/main" id="1" dur="indefinite" restart="never" nodeType="tmRoot">
           <p:childTnLst>
             <p:seq concurrent="1" nextAc="seek">
               <p:cTn id="2" dur="indefinite" nodeType="mainSeq">
@@ -8211,7 +8301,7 @@
   <p:timing>
     <p:tnLst>
       <p:par>
-        <p:cTn id="1" dur="indefinite" restart="never" nodeType="tmRoot">
+        <p:cTn xmlns:p14="http://schemas.microsoft.com/office/powerpoint/2010/main" id="1" dur="indefinite" restart="never" nodeType="tmRoot">
           <p:childTnLst>
             <p:seq concurrent="1" nextAc="seek">
               <p:cTn id="2" dur="indefinite" nodeType="mainSeq">

</xml_diff>

<commit_message>
passe sur la relecture de thierry de w1 et w2
</commit_message>
<xml_diff>
--- a/w1/w1-s6-av-slide1.pptx
+++ b/w1/w1-s6-av-slide1.pptx
@@ -167,7 +167,7 @@
       </p14:sectionLst>
     </p:ext>
     <p:ext uri="{EFAFB233-063F-42B5-8137-9DF3F51BA10A}">
-      <p15:sldGuideLst xmlns:p15="http://schemas.microsoft.com/office/powerpoint/2012/main" xmlns="">
+      <p15:sldGuideLst xmlns:p15="http://schemas.microsoft.com/office/powerpoint/2012/main">
         <p15:guide id="1" orient="horz" pos="2160" userDrawn="1">
           <p15:clr>
             <a:srgbClr val="A4A3A4"/>
@@ -418,7 +418,7 @@
               <a:pPr>
                 <a:defRPr/>
               </a:pPr>
-              <a:t>‹#›</a:t>
+              <a:t>‹N°›</a:t>
             </a:fld>
             <a:endParaRPr lang="en-US"/>
           </a:p>
@@ -593,7 +593,7 @@
           </a:ln>
           <a:extLst>
             <a:ext uri="{909E8E84-426E-40dd-AFC4-6F175D3DCCD1}">
-              <a14:hiddenFill xmlns:a14="http://schemas.microsoft.com/office/drawing/2010/main">
+              <a14:hiddenFill xmlns="" xmlns:a14="http://schemas.microsoft.com/office/drawing/2010/main">
                 <a:solidFill>
                   <a:srgbClr val="FFFFFF"/>
                 </a:solidFill>
@@ -778,7 +778,7 @@
               <a:pPr>
                 <a:defRPr/>
               </a:pPr>
-              <a:t>‹#›</a:t>
+              <a:t>‹N°›</a:t>
             </a:fld>
             <a:endParaRPr lang="en-US"/>
           </a:p>
@@ -1287,7 +1287,7 @@
   <p:timing>
     <p:tnLst>
       <p:par>
-        <p:cTn xmlns:p14="http://schemas.microsoft.com/office/powerpoint/2010/main" id="1" dur="indefinite" restart="never" nodeType="tmRoot"/>
+        <p:cTn id="1" dur="indefinite" restart="never" nodeType="tmRoot"/>
       </p:par>
     </p:tnLst>
   </p:timing>
@@ -1443,7 +1443,7 @@
               <a:pPr>
                 <a:defRPr/>
               </a:pPr>
-              <a:t>‹#›</a:t>
+              <a:t>‹N°›</a:t>
             </a:fld>
             <a:endParaRPr lang="fr-FR"/>
           </a:p>
@@ -1621,7 +1621,7 @@
               <a:pPr>
                 <a:defRPr/>
               </a:pPr>
-              <a:t>‹#›</a:t>
+              <a:t>‹N°›</a:t>
             </a:fld>
             <a:endParaRPr lang="fr-FR"/>
           </a:p>
@@ -1856,7 +1856,7 @@
               <a:pPr>
                 <a:defRPr/>
               </a:pPr>
-              <a:t>‹#›</a:t>
+              <a:t>‹N°›</a:t>
             </a:fld>
             <a:endParaRPr lang="fr-FR"/>
           </a:p>
@@ -2024,7 +2024,7 @@
               <a:pPr>
                 <a:defRPr/>
               </a:pPr>
-              <a:t>‹#›</a:t>
+              <a:t>‹N°›</a:t>
             </a:fld>
             <a:endParaRPr lang="fr-FR"/>
           </a:p>
@@ -2043,7 +2043,7 @@
   <p:timing>
     <p:tnLst>
       <p:par>
-        <p:cTn xmlns:p14="http://schemas.microsoft.com/office/powerpoint/2010/main" id="1" dur="indefinite" restart="never" nodeType="tmRoot"/>
+        <p:cTn id="1" dur="indefinite" restart="never" nodeType="tmRoot"/>
       </p:par>
     </p:tnLst>
   </p:timing>
@@ -2221,7 +2221,7 @@
               <a:pPr>
                 <a:defRPr/>
               </a:pPr>
-              <a:t>‹#›</a:t>
+              <a:t>‹N°›</a:t>
             </a:fld>
             <a:endParaRPr lang="fr-FR"/>
           </a:p>
@@ -2240,7 +2240,7 @@
   <p:timing>
     <p:tnLst>
       <p:par>
-        <p:cTn xmlns:p14="http://schemas.microsoft.com/office/powerpoint/2010/main" id="1" dur="indefinite" restart="never" nodeType="tmRoot"/>
+        <p:cTn id="1" dur="indefinite" restart="never" nodeType="tmRoot"/>
       </p:par>
     </p:tnLst>
   </p:timing>
@@ -2514,7 +2514,7 @@
               <a:pPr>
                 <a:defRPr/>
               </a:pPr>
-              <a:t>‹#›</a:t>
+              <a:t>‹N°›</a:t>
             </a:fld>
             <a:endParaRPr lang="fr-FR"/>
           </a:p>
@@ -2533,7 +2533,7 @@
   <p:timing>
     <p:tnLst>
       <p:par>
-        <p:cTn xmlns:p14="http://schemas.microsoft.com/office/powerpoint/2010/main" id="1" dur="indefinite" restart="never" nodeType="tmRoot"/>
+        <p:cTn id="1" dur="indefinite" restart="never" nodeType="tmRoot"/>
       </p:par>
     </p:tnLst>
   </p:timing>
@@ -2941,7 +2941,7 @@
               <a:pPr>
                 <a:defRPr/>
               </a:pPr>
-              <a:t>‹#›</a:t>
+              <a:t>‹N°›</a:t>
             </a:fld>
             <a:endParaRPr lang="fr-FR"/>
           </a:p>
@@ -2960,7 +2960,7 @@
   <p:timing>
     <p:tnLst>
       <p:par>
-        <p:cTn xmlns:p14="http://schemas.microsoft.com/office/powerpoint/2010/main" id="1" dur="indefinite" restart="never" nodeType="tmRoot"/>
+        <p:cTn id="1" dur="indefinite" restart="never" nodeType="tmRoot"/>
       </p:par>
     </p:tnLst>
   </p:timing>
@@ -3064,7 +3064,7 @@
               <a:pPr>
                 <a:defRPr/>
               </a:pPr>
-              <a:t>‹#›</a:t>
+              <a:t>‹N°›</a:t>
             </a:fld>
             <a:endParaRPr lang="fr-FR"/>
           </a:p>
@@ -3083,7 +3083,7 @@
   <p:timing>
     <p:tnLst>
       <p:par>
-        <p:cTn xmlns:p14="http://schemas.microsoft.com/office/powerpoint/2010/main" id="1" dur="indefinite" restart="never" nodeType="tmRoot"/>
+        <p:cTn id="1" dur="indefinite" restart="never" nodeType="tmRoot"/>
       </p:par>
     </p:tnLst>
   </p:timing>
@@ -3164,7 +3164,7 @@
               <a:pPr>
                 <a:defRPr/>
               </a:pPr>
-              <a:t>‹#›</a:t>
+              <a:t>‹N°›</a:t>
             </a:fld>
             <a:endParaRPr lang="fr-FR"/>
           </a:p>
@@ -3183,7 +3183,7 @@
   <p:timing>
     <p:tnLst>
       <p:par>
-        <p:cTn xmlns:p14="http://schemas.microsoft.com/office/powerpoint/2010/main" id="1" dur="indefinite" restart="never" nodeType="tmRoot"/>
+        <p:cTn id="1" dur="indefinite" restart="never" nodeType="tmRoot"/>
       </p:par>
     </p:tnLst>
   </p:timing>
@@ -3446,7 +3446,7 @@
               <a:pPr>
                 <a:defRPr/>
               </a:pPr>
-              <a:t>‹#›</a:t>
+              <a:t>‹N°›</a:t>
             </a:fld>
             <a:endParaRPr lang="fr-FR"/>
           </a:p>
@@ -3698,7 +3698,7 @@
               <a:pPr>
                 <a:defRPr/>
               </a:pPr>
-              <a:t>‹#›</a:t>
+              <a:t>‹N°›</a:t>
             </a:fld>
             <a:endParaRPr lang="fr-FR"/>
           </a:p>
@@ -3766,14 +3766,14 @@
           </a:ln>
           <a:extLst>
             <a:ext uri="{909E8E84-426E-40dd-AFC4-6F175D3DCCD1}">
-              <a14:hiddenFill xmlns:a14="http://schemas.microsoft.com/office/drawing/2010/main">
+              <a14:hiddenFill xmlns="" xmlns:a14="http://schemas.microsoft.com/office/drawing/2010/main">
                 <a:solidFill>
                   <a:srgbClr val="FFFFFF"/>
                 </a:solidFill>
               </a14:hiddenFill>
             </a:ext>
             <a:ext uri="{91240B29-F687-4f45-9708-019B960494DF}">
-              <a14:hiddenLine xmlns:a14="http://schemas.microsoft.com/office/drawing/2010/main" w="9525">
+              <a14:hiddenLine xmlns="" xmlns:a14="http://schemas.microsoft.com/office/drawing/2010/main" w="9525">
                 <a:solidFill>
                   <a:srgbClr val="000000"/>
                 </a:solidFill>
@@ -3824,14 +3824,14 @@
           </a:ln>
           <a:extLst>
             <a:ext uri="{909E8E84-426E-40dd-AFC4-6F175D3DCCD1}">
-              <a14:hiddenFill xmlns:a14="http://schemas.microsoft.com/office/drawing/2010/main">
+              <a14:hiddenFill xmlns="" xmlns:a14="http://schemas.microsoft.com/office/drawing/2010/main">
                 <a:solidFill>
                   <a:srgbClr val="FFFFFF"/>
                 </a:solidFill>
               </a14:hiddenFill>
             </a:ext>
             <a:ext uri="{91240B29-F687-4f45-9708-019B960494DF}">
-              <a14:hiddenLine xmlns:a14="http://schemas.microsoft.com/office/drawing/2010/main" w="9525">
+              <a14:hiddenLine xmlns="" xmlns:a14="http://schemas.microsoft.com/office/drawing/2010/main" w="9525">
                 <a:solidFill>
                   <a:srgbClr val="000000"/>
                 </a:solidFill>
@@ -3997,7 +3997,7 @@
               <a:pPr>
                 <a:defRPr/>
               </a:pPr>
-              <a:t>‹#›</a:t>
+              <a:t>‹N°›</a:t>
             </a:fld>
             <a:endParaRPr lang="fr-FR" dirty="0"/>
           </a:p>
@@ -4023,7 +4023,7 @@
   <p:timing>
     <p:tnLst>
       <p:par>
-        <p:cTn xmlns:p14="http://schemas.microsoft.com/office/powerpoint/2010/main" id="1" dur="indefinite" restart="never" nodeType="tmRoot"/>
+        <p:cTn id="1" dur="indefinite" restart="never" nodeType="tmRoot"/>
       </p:par>
     </p:tnLst>
   </p:timing>
@@ -4487,7 +4487,7 @@
   <p:timing>
     <p:tnLst>
       <p:par>
-        <p:cTn xmlns:p14="http://schemas.microsoft.com/office/powerpoint/2010/main" id="1" dur="indefinite" restart="never" nodeType="tmRoot">
+        <p:cTn id="1" dur="indefinite" restart="never" nodeType="tmRoot">
           <p:childTnLst>
             <p:seq concurrent="1" nextAc="seek">
               <p:cTn id="2" dur="indefinite" nodeType="mainSeq">
@@ -4833,7 +4833,7 @@
   <p:timing>
     <p:tnLst>
       <p:par>
-        <p:cTn xmlns:p14="http://schemas.microsoft.com/office/powerpoint/2010/main" id="1" dur="indefinite" restart="never" nodeType="tmRoot">
+        <p:cTn id="1" dur="indefinite" restart="never" nodeType="tmRoot">
           <p:childTnLst>
             <p:seq concurrent="1" nextAc="seek">
               <p:cTn id="2" dur="indefinite" nodeType="mainSeq">
@@ -5787,7 +5787,7 @@
   <p:timing>
     <p:tnLst>
       <p:par>
-        <p:cTn xmlns:p14="http://schemas.microsoft.com/office/powerpoint/2010/main" id="1" dur="indefinite" restart="never" nodeType="tmRoot">
+        <p:cTn id="1" dur="indefinite" restart="never" nodeType="tmRoot">
           <p:childTnLst>
             <p:seq concurrent="1" nextAc="seek">
               <p:cTn id="2" dur="indefinite" nodeType="mainSeq">
@@ -6371,11 +6371,18 @@
           <a:lstStyle/>
           <a:p>
             <a:r>
+              <a:rPr lang="fr-FR" sz="4400" smtClean="0">
+                <a:latin typeface="Courier New" panose="02070309020205020404" pitchFamily="49" charset="0"/>
+                <a:cs typeface="Courier New" panose="02070309020205020404" pitchFamily="49" charset="0"/>
+              </a:rPr>
+              <a:t>&gt;&gt;&gt; note </a:t>
+            </a:r>
+            <a:r>
               <a:rPr lang="fr-FR" sz="4400" dirty="0" smtClean="0">
                 <a:latin typeface="Courier New" panose="02070309020205020404" pitchFamily="49" charset="0"/>
                 <a:cs typeface="Courier New" panose="02070309020205020404" pitchFamily="49" charset="0"/>
               </a:rPr>
-              <a:t>&gt;&gt;&gt; a = 1</a:t>
+              <a:t>= 1</a:t>
             </a:r>
             <a:endParaRPr lang="fr-FR" sz="4400" dirty="0">
               <a:latin typeface="Courier New" panose="02070309020205020404" pitchFamily="49" charset="0"/>
@@ -6397,7 +6404,7 @@
   <p:timing>
     <p:tnLst>
       <p:par>
-        <p:cTn xmlns:p14="http://schemas.microsoft.com/office/powerpoint/2010/main" id="1" dur="indefinite" restart="never" nodeType="tmRoot">
+        <p:cTn id="1" dur="indefinite" restart="never" nodeType="tmRoot">
           <p:childTnLst>
             <p:seq concurrent="1" nextAc="seek">
               <p:cTn id="2" dur="indefinite" nodeType="mainSeq">
@@ -6588,7 +6595,7 @@
   <p:timing>
     <p:tnLst>
       <p:par>
-        <p:cTn xmlns:p14="http://schemas.microsoft.com/office/powerpoint/2010/main" id="1" dur="indefinite" restart="never" nodeType="tmRoot">
+        <p:cTn id="1" dur="indefinite" restart="never" nodeType="tmRoot">
           <p:childTnLst>
             <p:seq concurrent="1" nextAc="seek">
               <p:cTn id="2" dur="indefinite" nodeType="mainSeq">
@@ -6888,7 +6895,7 @@
         <p:spPr>
           <a:xfrm>
             <a:off x="713678" y="780585"/>
-            <a:ext cx="9233210" cy="3477875"/>
+            <a:ext cx="9233210" cy="4154984"/>
           </a:xfrm>
           <a:prstGeom prst="rect">
             <a:avLst/>
@@ -6933,6 +6940,18 @@
           </a:p>
           <a:p>
             <a:r>
+              <a:rPr lang="fr-FR" sz="4400" strike="sngStrike" dirty="0" smtClean="0">
+                <a:solidFill>
+                  <a:srgbClr val="FF0000"/>
+                </a:solidFill>
+                <a:latin typeface="Courier New" panose="02070309020205020404" pitchFamily="49" charset="0"/>
+                <a:cs typeface="Courier New" panose="02070309020205020404" pitchFamily="49" charset="0"/>
+              </a:rPr>
+              <a:t>06_departement</a:t>
+            </a:r>
+          </a:p>
+          <a:p>
+            <a:r>
               <a:rPr lang="fr-FR" sz="4400" dirty="0">
                 <a:solidFill>
                   <a:srgbClr val="00B050"/>
@@ -6940,37 +6959,10 @@
                 <a:latin typeface="Courier New" panose="02070309020205020404" pitchFamily="49" charset="0"/>
                 <a:cs typeface="Courier New" panose="02070309020205020404" pitchFamily="49" charset="0"/>
               </a:rPr>
-              <a:t>d</a:t>
-            </a:r>
-            <a:r>
-              <a:rPr lang="fr-FR" sz="4400" dirty="0" smtClean="0">
-                <a:solidFill>
-                  <a:srgbClr val="00B050"/>
-                </a:solidFill>
-                <a:latin typeface="Courier New" panose="02070309020205020404" pitchFamily="49" charset="0"/>
-                <a:cs typeface="Courier New" panose="02070309020205020404" pitchFamily="49" charset="0"/>
-              </a:rPr>
-              <a:t>epartement_06</a:t>
-            </a:r>
-            <a:endParaRPr lang="fr-FR" sz="4400" dirty="0">
-              <a:solidFill>
-                <a:srgbClr val="00B050"/>
-              </a:solidFill>
-              <a:latin typeface="Courier New" panose="02070309020205020404" pitchFamily="49" charset="0"/>
-              <a:cs typeface="Courier New" panose="02070309020205020404" pitchFamily="49" charset="0"/>
-            </a:endParaRPr>
-          </a:p>
-          <a:p>
-            <a:r>
-              <a:rPr lang="fr-FR" sz="4400" strike="sngStrike" dirty="0" smtClean="0">
-                <a:solidFill>
-                  <a:srgbClr val="FF0000"/>
-                </a:solidFill>
-                <a:latin typeface="Courier New" panose="02070309020205020404" pitchFamily="49" charset="0"/>
-                <a:cs typeface="Courier New" panose="02070309020205020404" pitchFamily="49" charset="0"/>
-              </a:rPr>
-              <a:t>18_departement</a:t>
-            </a:r>
+              <a:t>departement_06</a:t>
+            </a:r>
+          </a:p>
+          <a:p>
             <a:endParaRPr lang="fr-FR" sz="4400" strike="sngStrike" dirty="0" smtClean="0">
               <a:solidFill>
                 <a:srgbClr val="FF0000"/>
@@ -7003,7 +6995,7 @@
   <p:timing>
     <p:tnLst>
       <p:par>
-        <p:cTn xmlns:p14="http://schemas.microsoft.com/office/powerpoint/2010/main" id="1" dur="indefinite" restart="never" nodeType="tmRoot">
+        <p:cTn id="1" dur="indefinite" restart="never" nodeType="tmRoot">
           <p:childTnLst>
             <p:seq concurrent="1" nextAc="seek">
               <p:cTn id="2" dur="indefinite" nodeType="mainSeq">
@@ -7161,7 +7153,7 @@
                                         <p:tgtEl>
                                           <p:spTgt spid="4">
                                             <p:txEl>
-                                              <p:pRg st="3" end="3"/>
+                                              <p:pRg st="2" end="2"/>
                                             </p:txEl>
                                           </p:spTgt>
                                         </p:tgtEl>
@@ -7179,7 +7171,7 @@
                                         <p:tgtEl>
                                           <p:spTgt spid="4">
                                             <p:txEl>
-                                              <p:pRg st="3" end="3"/>
+                                              <p:pRg st="2" end="2"/>
                                             </p:txEl>
                                           </p:spTgt>
                                         </p:tgtEl>
@@ -7222,7 +7214,7 @@
                                         <p:tgtEl>
                                           <p:spTgt spid="4">
                                             <p:txEl>
-                                              <p:pRg st="2" end="2"/>
+                                              <p:pRg st="3" end="3"/>
                                             </p:txEl>
                                           </p:spTgt>
                                         </p:tgtEl>
@@ -7240,7 +7232,7 @@
                                         <p:tgtEl>
                                           <p:spTgt spid="4">
                                             <p:txEl>
-                                              <p:pRg st="2" end="2"/>
+                                              <p:pRg st="3" end="3"/>
                                             </p:txEl>
                                           </p:spTgt>
                                         </p:tgtEl>
@@ -7360,7 +7352,7 @@
   <p:timing>
     <p:tnLst>
       <p:par>
-        <p:cTn xmlns:p14="http://schemas.microsoft.com/office/powerpoint/2010/main" id="1" dur="indefinite" restart="never" nodeType="tmRoot">
+        <p:cTn id="1" dur="indefinite" restart="never" nodeType="tmRoot">
           <p:childTnLst>
             <p:seq concurrent="1" nextAc="seek">
               <p:cTn id="2" dur="indefinite" nodeType="mainSeq">
@@ -7557,7 +7549,7 @@
   <p:timing>
     <p:tnLst>
       <p:par>
-        <p:cTn xmlns:p14="http://schemas.microsoft.com/office/powerpoint/2010/main" id="1" dur="indefinite" restart="never" nodeType="tmRoot">
+        <p:cTn id="1" dur="indefinite" restart="never" nodeType="tmRoot">
           <p:childTnLst>
             <p:seq concurrent="1" nextAc="seek">
               <p:cTn id="2" dur="indefinite" nodeType="mainSeq">
@@ -7949,7 +7941,7 @@
         <p:spPr>
           <a:xfrm>
             <a:off x="7877908" y="1033540"/>
-            <a:ext cx="6669809" cy="1323439"/>
+            <a:ext cx="6669809" cy="1938992"/>
           </a:xfrm>
           <a:prstGeom prst="rect">
             <a:avLst/>
@@ -7976,8 +7968,42 @@
                 <a:latin typeface="Courier New" panose="02070309020205020404" pitchFamily="49" charset="0"/>
                 <a:cs typeface="Courier New" panose="02070309020205020404" pitchFamily="49" charset="0"/>
               </a:rPr>
-              <a:t>&gt;&gt;&gt; a = 'spam'</a:t>
-            </a:r>
+              <a:t>&gt;&gt;&gt; a = </a:t>
+            </a:r>
+            <a:r>
+              <a:rPr lang="fr-FR" sz="4000" dirty="0" smtClean="0">
+                <a:latin typeface="Courier New" panose="02070309020205020404" pitchFamily="49" charset="0"/>
+                <a:cs typeface="Courier New" panose="02070309020205020404" pitchFamily="49" charset="0"/>
+              </a:rPr>
+              <a:t>'spam'</a:t>
+            </a:r>
+          </a:p>
+          <a:p>
+            <a:r>
+              <a:rPr lang="fr-FR" sz="4000" dirty="0" smtClean="0">
+                <a:latin typeface="Courier New" panose="02070309020205020404" pitchFamily="49" charset="0"/>
+                <a:cs typeface="Courier New" panose="02070309020205020404" pitchFamily="49" charset="0"/>
+              </a:rPr>
+              <a:t>&gt;&gt;&gt; </a:t>
+            </a:r>
+            <a:r>
+              <a:rPr lang="fr-FR" sz="4000" dirty="0" err="1" smtClean="0">
+                <a:latin typeface="Courier New" panose="02070309020205020404" pitchFamily="49" charset="0"/>
+                <a:cs typeface="Courier New" panose="02070309020205020404" pitchFamily="49" charset="0"/>
+              </a:rPr>
+              <a:t>del</a:t>
+            </a:r>
+            <a:r>
+              <a:rPr lang="fr-FR" sz="4000" dirty="0" smtClean="0">
+                <a:latin typeface="Courier New" panose="02070309020205020404" pitchFamily="49" charset="0"/>
+                <a:cs typeface="Courier New" panose="02070309020205020404" pitchFamily="49" charset="0"/>
+              </a:rPr>
+              <a:t> a</a:t>
+            </a:r>
+            <a:endParaRPr lang="fr-FR" sz="4000" dirty="0">
+              <a:latin typeface="Courier New" panose="02070309020205020404" pitchFamily="49" charset="0"/>
+              <a:cs typeface="Courier New" panose="02070309020205020404" pitchFamily="49" charset="0"/>
+            </a:endParaRPr>
           </a:p>
         </p:txBody>
       </p:sp>
@@ -8301,7 +8327,7 @@
   <p:timing>
     <p:tnLst>
       <p:par>
-        <p:cTn xmlns:p14="http://schemas.microsoft.com/office/powerpoint/2010/main" id="1" dur="indefinite" restart="never" nodeType="tmRoot">
+        <p:cTn id="1" dur="indefinite" restart="never" nodeType="tmRoot">
           <p:childTnLst>
             <p:seq concurrent="1" nextAc="seek">
               <p:cTn id="2" dur="indefinite" nodeType="mainSeq">
@@ -8992,6 +9018,155 @@
                       </p:childTnLst>
                     </p:cTn>
                   </p:par>
+                  <p:par>
+                    <p:cTn id="65" fill="hold">
+                      <p:stCondLst>
+                        <p:cond delay="indefinite"/>
+                      </p:stCondLst>
+                      <p:childTnLst>
+                        <p:par>
+                          <p:cTn id="66" fill="hold">
+                            <p:stCondLst>
+                              <p:cond delay="0"/>
+                            </p:stCondLst>
+                            <p:childTnLst>
+                              <p:par>
+                                <p:cTn id="67" presetID="10" presetClass="entr" presetSubtype="0" fill="hold" nodeType="clickEffect">
+                                  <p:stCondLst>
+                                    <p:cond delay="0"/>
+                                  </p:stCondLst>
+                                  <p:childTnLst>
+                                    <p:set>
+                                      <p:cBhvr>
+                                        <p:cTn id="68" dur="1" fill="hold">
+                                          <p:stCondLst>
+                                            <p:cond delay="0"/>
+                                          </p:stCondLst>
+                                        </p:cTn>
+                                        <p:tgtEl>
+                                          <p:spTgt spid="2">
+                                            <p:txEl>
+                                              <p:pRg st="2" end="2"/>
+                                            </p:txEl>
+                                          </p:spTgt>
+                                        </p:tgtEl>
+                                        <p:attrNameLst>
+                                          <p:attrName>style.visibility</p:attrName>
+                                        </p:attrNameLst>
+                                      </p:cBhvr>
+                                      <p:to>
+                                        <p:strVal val="visible"/>
+                                      </p:to>
+                                    </p:set>
+                                    <p:animEffect transition="in" filter="fade">
+                                      <p:cBhvr>
+                                        <p:cTn id="69" dur="500"/>
+                                        <p:tgtEl>
+                                          <p:spTgt spid="2">
+                                            <p:txEl>
+                                              <p:pRg st="2" end="2"/>
+                                            </p:txEl>
+                                          </p:spTgt>
+                                        </p:tgtEl>
+                                      </p:cBhvr>
+                                    </p:animEffect>
+                                  </p:childTnLst>
+                                </p:cTn>
+                              </p:par>
+                            </p:childTnLst>
+                          </p:cTn>
+                        </p:par>
+                      </p:childTnLst>
+                    </p:cTn>
+                  </p:par>
+                  <p:par>
+                    <p:cTn id="70" fill="hold">
+                      <p:stCondLst>
+                        <p:cond delay="indefinite"/>
+                      </p:stCondLst>
+                      <p:childTnLst>
+                        <p:par>
+                          <p:cTn id="71" fill="hold">
+                            <p:stCondLst>
+                              <p:cond delay="0"/>
+                            </p:stCondLst>
+                            <p:childTnLst>
+                              <p:par>
+                                <p:cTn id="72" presetID="10" presetClass="exit" presetSubtype="0" fill="hold" grpId="1" nodeType="clickEffect">
+                                  <p:stCondLst>
+                                    <p:cond delay="0"/>
+                                  </p:stCondLst>
+                                  <p:childTnLst>
+                                    <p:animEffect transition="out" filter="fade">
+                                      <p:cBhvr>
+                                        <p:cTn id="73" dur="500"/>
+                                        <p:tgtEl>
+                                          <p:spTgt spid="9"/>
+                                        </p:tgtEl>
+                                      </p:cBhvr>
+                                    </p:animEffect>
+                                    <p:set>
+                                      <p:cBhvr>
+                                        <p:cTn id="74" dur="1" fill="hold">
+                                          <p:stCondLst>
+                                            <p:cond delay="499"/>
+                                          </p:stCondLst>
+                                        </p:cTn>
+                                        <p:tgtEl>
+                                          <p:spTgt spid="9"/>
+                                        </p:tgtEl>
+                                        <p:attrNameLst>
+                                          <p:attrName>style.visibility</p:attrName>
+                                        </p:attrNameLst>
+                                      </p:cBhvr>
+                                      <p:to>
+                                        <p:strVal val="hidden"/>
+                                      </p:to>
+                                    </p:set>
+                                  </p:childTnLst>
+                                </p:cTn>
+                              </p:par>
+                              <p:par>
+                                <p:cTn id="75" presetID="10" presetClass="exit" presetSubtype="0" fill="hold" grpId="1" nodeType="withEffect">
+                                  <p:stCondLst>
+                                    <p:cond delay="0"/>
+                                  </p:stCondLst>
+                                  <p:childTnLst>
+                                    <p:animEffect transition="out" filter="fade">
+                                      <p:cBhvr>
+                                        <p:cTn id="76" dur="500"/>
+                                        <p:tgtEl>
+                                          <p:spTgt spid="13"/>
+                                        </p:tgtEl>
+                                      </p:cBhvr>
+                                    </p:animEffect>
+                                    <p:set>
+                                      <p:cBhvr>
+                                        <p:cTn id="77" dur="1" fill="hold">
+                                          <p:stCondLst>
+                                            <p:cond delay="499"/>
+                                          </p:stCondLst>
+                                        </p:cTn>
+                                        <p:tgtEl>
+                                          <p:spTgt spid="13"/>
+                                        </p:tgtEl>
+                                        <p:attrNameLst>
+                                          <p:attrName>style.visibility</p:attrName>
+                                        </p:attrNameLst>
+                                      </p:cBhvr>
+                                      <p:to>
+                                        <p:strVal val="hidden"/>
+                                      </p:to>
+                                    </p:set>
+                                  </p:childTnLst>
+                                </p:cTn>
+                              </p:par>
+                            </p:childTnLst>
+                          </p:cTn>
+                        </p:par>
+                      </p:childTnLst>
+                    </p:cTn>
+                  </p:par>
                 </p:childTnLst>
               </p:cTn>
               <p:prevCondLst>
@@ -9020,10 +9195,12 @@
       <p:bldP spid="7" grpId="0"/>
       <p:bldP spid="8" grpId="0" animBg="1"/>
       <p:bldP spid="9" grpId="0"/>
+      <p:bldP spid="9" grpId="1"/>
       <p:bldP spid="12" grpId="0" animBg="1"/>
       <p:bldP spid="12" grpId="1" animBg="1"/>
       <p:bldP spid="10" grpId="0" animBg="1"/>
       <p:bldP spid="13" grpId="0" animBg="1"/>
+      <p:bldP spid="13" grpId="1" animBg="1"/>
       <p:bldP spid="14" grpId="0"/>
       <p:bldP spid="14" grpId="1"/>
     </p:bldLst>

</xml_diff>